<commit_message>
Graphics change and final Task1
Minor changes to task 1 PDF and changes to the graphics.
</commit_message>
<xml_diff>
--- a/Graphics.pptx
+++ b/Graphics.pptx
@@ -104,6 +104,11 @@
       </a:defRPr>
     </a:lvl9pPr>
   </p:defaultTextStyle>
+  <p:extLst>
+    <p:ext uri="{EFAFB233-063F-42B5-8137-9DF3F51BA10A}">
+      <p15:sldGuideLst xmlns:p15="http://schemas.microsoft.com/office/powerpoint/2012/main"/>
+    </p:ext>
+  </p:extLst>
 </p:presentation>
 </file>
 
@@ -256,7 +261,7 @@
           <a:p>
             <a:fld id="{739517E5-A5B6-4E79-8EFD-89550F75F336}" type="datetimeFigureOut">
               <a:rPr lang="en-GB" smtClean="0"/>
-              <a:t>25/04/2019</a:t>
+              <a:t>02/05/2019</a:t>
             </a:fld>
             <a:endParaRPr lang="en-GB"/>
           </a:p>
@@ -456,7 +461,7 @@
           <a:p>
             <a:fld id="{739517E5-A5B6-4E79-8EFD-89550F75F336}" type="datetimeFigureOut">
               <a:rPr lang="en-GB" smtClean="0"/>
-              <a:t>25/04/2019</a:t>
+              <a:t>02/05/2019</a:t>
             </a:fld>
             <a:endParaRPr lang="en-GB"/>
           </a:p>
@@ -666,7 +671,7 @@
           <a:p>
             <a:fld id="{739517E5-A5B6-4E79-8EFD-89550F75F336}" type="datetimeFigureOut">
               <a:rPr lang="en-GB" smtClean="0"/>
-              <a:t>25/04/2019</a:t>
+              <a:t>02/05/2019</a:t>
             </a:fld>
             <a:endParaRPr lang="en-GB"/>
           </a:p>
@@ -866,7 +871,7 @@
           <a:p>
             <a:fld id="{739517E5-A5B6-4E79-8EFD-89550F75F336}" type="datetimeFigureOut">
               <a:rPr lang="en-GB" smtClean="0"/>
-              <a:t>25/04/2019</a:t>
+              <a:t>02/05/2019</a:t>
             </a:fld>
             <a:endParaRPr lang="en-GB"/>
           </a:p>
@@ -1142,7 +1147,7 @@
           <a:p>
             <a:fld id="{739517E5-A5B6-4E79-8EFD-89550F75F336}" type="datetimeFigureOut">
               <a:rPr lang="en-GB" smtClean="0"/>
-              <a:t>25/04/2019</a:t>
+              <a:t>02/05/2019</a:t>
             </a:fld>
             <a:endParaRPr lang="en-GB"/>
           </a:p>
@@ -1410,7 +1415,7 @@
           <a:p>
             <a:fld id="{739517E5-A5B6-4E79-8EFD-89550F75F336}" type="datetimeFigureOut">
               <a:rPr lang="en-GB" smtClean="0"/>
-              <a:t>25/04/2019</a:t>
+              <a:t>02/05/2019</a:t>
             </a:fld>
             <a:endParaRPr lang="en-GB"/>
           </a:p>
@@ -1825,7 +1830,7 @@
           <a:p>
             <a:fld id="{739517E5-A5B6-4E79-8EFD-89550F75F336}" type="datetimeFigureOut">
               <a:rPr lang="en-GB" smtClean="0"/>
-              <a:t>25/04/2019</a:t>
+              <a:t>02/05/2019</a:t>
             </a:fld>
             <a:endParaRPr lang="en-GB"/>
           </a:p>
@@ -1967,7 +1972,7 @@
           <a:p>
             <a:fld id="{739517E5-A5B6-4E79-8EFD-89550F75F336}" type="datetimeFigureOut">
               <a:rPr lang="en-GB" smtClean="0"/>
-              <a:t>25/04/2019</a:t>
+              <a:t>02/05/2019</a:t>
             </a:fld>
             <a:endParaRPr lang="en-GB"/>
           </a:p>
@@ -2080,7 +2085,7 @@
           <a:p>
             <a:fld id="{739517E5-A5B6-4E79-8EFD-89550F75F336}" type="datetimeFigureOut">
               <a:rPr lang="en-GB" smtClean="0"/>
-              <a:t>25/04/2019</a:t>
+              <a:t>02/05/2019</a:t>
             </a:fld>
             <a:endParaRPr lang="en-GB"/>
           </a:p>
@@ -2393,7 +2398,7 @@
           <a:p>
             <a:fld id="{739517E5-A5B6-4E79-8EFD-89550F75F336}" type="datetimeFigureOut">
               <a:rPr lang="en-GB" smtClean="0"/>
-              <a:t>25/04/2019</a:t>
+              <a:t>02/05/2019</a:t>
             </a:fld>
             <a:endParaRPr lang="en-GB"/>
           </a:p>
@@ -2682,7 +2687,7 @@
           <a:p>
             <a:fld id="{739517E5-A5B6-4E79-8EFD-89550F75F336}" type="datetimeFigureOut">
               <a:rPr lang="en-GB" smtClean="0"/>
-              <a:t>25/04/2019</a:t>
+              <a:t>02/05/2019</a:t>
             </a:fld>
             <a:endParaRPr lang="en-GB"/>
           </a:p>
@@ -2925,7 +2930,7 @@
           <a:p>
             <a:fld id="{739517E5-A5B6-4E79-8EFD-89550F75F336}" type="datetimeFigureOut">
               <a:rPr lang="en-GB" smtClean="0"/>
-              <a:t>25/04/2019</a:t>
+              <a:t>02/05/2019</a:t>
             </a:fld>
             <a:endParaRPr lang="en-GB"/>
           </a:p>
@@ -3951,7 +3956,7 @@
         </p:blipFill>
         <p:spPr>
           <a:xfrm>
-            <a:off x="5775460" y="5086961"/>
+            <a:off x="5789708" y="5884320"/>
             <a:ext cx="612584" cy="489711"/>
           </a:xfrm>
           <a:prstGeom prst="rect">
@@ -3976,8 +3981,8 @@
         </p:nvCxnSpPr>
         <p:spPr>
           <a:xfrm flipV="1">
-            <a:off x="6081752" y="4864663"/>
-            <a:ext cx="19465" cy="222298"/>
+            <a:off x="6096000" y="3968999"/>
+            <a:ext cx="18237" cy="1915321"/>
           </a:xfrm>
           <a:prstGeom prst="straightConnector1">
             <a:avLst/>
@@ -4018,7 +4023,7 @@
         </p:nvSpPr>
         <p:spPr>
           <a:xfrm>
-            <a:off x="5645198" y="5519307"/>
+            <a:off x="5659446" y="6316666"/>
             <a:ext cx="969496" cy="276999"/>
           </a:xfrm>
           <a:prstGeom prst="rect">

</xml_diff>